<commit_message>
Update Group 3 – FINANCIAL ANALYSIS.pptx
</commit_message>
<xml_diff>
--- a/presentation/Group 3 – FINANCIAL ANALYSIS.pptx
+++ b/presentation/Group 3 – FINANCIAL ANALYSIS.pptx
@@ -30,14 +30,15 @@
     <p:sldId id="275" r:id="rId24"/>
     <p:sldId id="276" r:id="rId25"/>
     <p:sldId id="277" r:id="rId26"/>
+    <p:sldId id="278" r:id="rId27"/>
   </p:sldIdLst>
   <p:sldSz cy="6858000" cx="12192000"/>
   <p:notesSz cx="6858000" cy="9144000"/>
   <p:embeddedFontLst>
     <p:embeddedFont>
       <p:font typeface="Gill Sans"/>
-      <p:regular r:id="rId27"/>
-      <p:bold r:id="rId28"/>
+      <p:regular r:id="rId28"/>
+      <p:bold r:id="rId29"/>
     </p:embeddedFont>
   </p:embeddedFontLst>
   <p:defaultTextStyle>
@@ -271,7 +272,7 @@
   </p:defaultTextStyle>
   <p:extLst>
     <p:ext uri="GoogleSlidesCustomDataVersion2">
-      <go:slidesCustomData xmlns:go="http://customooxmlschemas.google.com/" r:id="rId29" roundtripDataSignature="AMtx7mj395Opauwxy4ZiFVffEToAcjB0Nw=="/>
+      <go:slidesCustomData xmlns:go="http://customooxmlschemas.google.com/" r:id="rId30" roundtripDataSignature="AMtx7mgxSHYtHOrB7mPrssav4drK83poMQ=="/>
     </p:ext>
   </p:extLst>
 </p:presentation>
@@ -1514,7 +1515,42 @@
       </p:grpSpPr>
       <p:sp>
         <p:nvSpPr>
-          <p:cNvPr id="204" name="Google Shape;204;p22:notes"/>
+          <p:cNvPr id="204" name="Google Shape;204;g2c4b658579b_0_3:notes"/>
+          <p:cNvSpPr/>
+          <p:nvPr>
+            <p:ph idx="2" type="sldImg"/>
+          </p:nvPr>
+        </p:nvSpPr>
+        <p:spPr>
+          <a:xfrm>
+            <a:off x="1143225" y="685800"/>
+            <a:ext cx="4572300" cy="3429000"/>
+          </a:xfrm>
+          <a:custGeom>
+            <a:rect b="b" l="l" r="r" t="t"/>
+            <a:pathLst>
+              <a:path extrusionOk="0" h="120000" w="120000">
+                <a:moveTo>
+                  <a:pt x="0" y="0"/>
+                </a:moveTo>
+                <a:lnTo>
+                  <a:pt x="120000" y="0"/>
+                </a:lnTo>
+                <a:lnTo>
+                  <a:pt x="120000" y="120000"/>
+                </a:lnTo>
+                <a:lnTo>
+                  <a:pt x="0" y="120000"/>
+                </a:lnTo>
+                <a:close/>
+              </a:path>
+            </a:pathLst>
+          </a:custGeom>
+        </p:spPr>
+      </p:sp>
+      <p:sp>
+        <p:nvSpPr>
+          <p:cNvPr id="205" name="Google Shape;205;g2c4b658579b_0_3:notes"/>
           <p:cNvSpPr txBox="1"/>
           <p:nvPr>
             <p:ph idx="1" type="body"/>
@@ -1551,9 +1587,73 @@
           </a:p>
         </p:txBody>
       </p:sp>
+    </p:spTree>
+  </p:cSld>
+  <p:clrMapOvr>
+    <a:masterClrMapping/>
+  </p:clrMapOvr>
+</p:notes>
+</file>
+
+<file path=ppt/notesSlides/notesSlide18.xml><?xml version="1.0" encoding="utf-8"?>
+<p:notes xmlns:a="http://schemas.openxmlformats.org/drawingml/2006/main" xmlns:r="http://schemas.openxmlformats.org/officeDocument/2006/relationships" xmlns:mc="http://schemas.openxmlformats.org/markup-compatibility/2006" xmlns:mv="urn:schemas-microsoft-com:mac:vml" xmlns:p="http://schemas.openxmlformats.org/presentationml/2006/main" xmlns:c="http://schemas.openxmlformats.org/drawingml/2006/chart" xmlns:dgm="http://schemas.openxmlformats.org/drawingml/2006/diagram" xmlns:o="urn:schemas-microsoft-com:office:office" xmlns:v="urn:schemas-microsoft-com:vml" xmlns:pvml="urn:schemas-microsoft-com:office:powerpoint" xmlns:com="http://schemas.openxmlformats.org/drawingml/2006/compatibility" xmlns:p14="http://schemas.microsoft.com/office/powerpoint/2010/main" xmlns:p15="http://schemas.microsoft.com/office/powerpoint/2012/main" xmlns:ahyp="http://schemas.microsoft.com/office/drawing/2018/hyperlinkcolor" showMasterPhAnim="0" showMasterSp="0">
+  <p:cSld>
+    <p:spTree>
+      <p:nvGrpSpPr>
+        <p:cNvPr id="210" name="Shape 210"/>
+        <p:cNvGrpSpPr/>
+        <p:nvPr/>
+      </p:nvGrpSpPr>
+      <p:grpSpPr>
+        <a:xfrm>
+          <a:off x="0" y="0"/>
+          <a:ext cx="0" cy="0"/>
+          <a:chOff x="0" y="0"/>
+          <a:chExt cx="0" cy="0"/>
+        </a:xfrm>
+      </p:grpSpPr>
       <p:sp>
         <p:nvSpPr>
-          <p:cNvPr id="205" name="Google Shape;205;p22:notes"/>
+          <p:cNvPr id="211" name="Google Shape;211;p22:notes"/>
+          <p:cNvSpPr txBox="1"/>
+          <p:nvPr>
+            <p:ph idx="1" type="body"/>
+          </p:nvPr>
+        </p:nvSpPr>
+        <p:spPr>
+          <a:xfrm>
+            <a:off x="685800" y="4343400"/>
+            <a:ext cx="5486400" cy="4114800"/>
+          </a:xfrm>
+          <a:prstGeom prst="rect">
+            <a:avLst/>
+          </a:prstGeom>
+        </p:spPr>
+        <p:txBody>
+          <a:bodyPr anchorCtr="0" anchor="t" bIns="91425" lIns="91425" spcFirstLastPara="1" rIns="91425" wrap="square" tIns="91425">
+            <a:noAutofit/>
+          </a:bodyPr>
+          <a:lstStyle/>
+          <a:p>
+            <a:pPr indent="0" lvl="0" marL="0" rtl="0" algn="l">
+              <a:spcBef>
+                <a:spcPts val="0"/>
+              </a:spcBef>
+              <a:spcAft>
+                <a:spcPts val="0"/>
+              </a:spcAft>
+              <a:buNone/>
+            </a:pPr>
+            <a:r>
+              <a:t/>
+            </a:r>
+            <a:endParaRPr/>
+          </a:p>
+        </p:txBody>
+      </p:sp>
+      <p:sp>
+        <p:nvSpPr>
+          <p:cNvPr id="212" name="Google Shape;212;p22:notes"/>
           <p:cNvSpPr/>
           <p:nvPr>
             <p:ph idx="2" type="sldImg"/>
@@ -1594,12 +1694,12 @@
 </p:notes>
 </file>
 
-<file path=ppt/notesSlides/notesSlide18.xml><?xml version="1.0" encoding="utf-8"?>
+<file path=ppt/notesSlides/notesSlide19.xml><?xml version="1.0" encoding="utf-8"?>
 <p:notes xmlns:a="http://schemas.openxmlformats.org/drawingml/2006/main" xmlns:r="http://schemas.openxmlformats.org/officeDocument/2006/relationships" xmlns:mc="http://schemas.openxmlformats.org/markup-compatibility/2006" xmlns:mv="urn:schemas-microsoft-com:mac:vml" xmlns:p="http://schemas.openxmlformats.org/presentationml/2006/main" xmlns:c="http://schemas.openxmlformats.org/drawingml/2006/chart" xmlns:dgm="http://schemas.openxmlformats.org/drawingml/2006/diagram" xmlns:o="urn:schemas-microsoft-com:office:office" xmlns:v="urn:schemas-microsoft-com:vml" xmlns:pvml="urn:schemas-microsoft-com:office:powerpoint" xmlns:com="http://schemas.openxmlformats.org/drawingml/2006/compatibility" xmlns:p14="http://schemas.microsoft.com/office/powerpoint/2010/main" xmlns:p15="http://schemas.microsoft.com/office/powerpoint/2012/main" xmlns:ahyp="http://schemas.microsoft.com/office/drawing/2018/hyperlinkcolor" showMasterPhAnim="0" showMasterSp="0">
   <p:cSld>
     <p:spTree>
       <p:nvGrpSpPr>
-        <p:cNvPr id="209" name="Shape 209"/>
+        <p:cNvPr id="216" name="Shape 216"/>
         <p:cNvGrpSpPr/>
         <p:nvPr/>
       </p:nvGrpSpPr>
@@ -1613,7 +1713,7 @@
       </p:grpSpPr>
       <p:sp>
         <p:nvSpPr>
-          <p:cNvPr id="210" name="Google Shape;210;g2c48598d1a9_3_5:notes"/>
+          <p:cNvPr id="217" name="Google Shape;217;g2c48598d1a9_3_5:notes"/>
           <p:cNvSpPr/>
           <p:nvPr>
             <p:ph idx="2" type="sldImg"/>
@@ -1648,7 +1748,7 @@
       </p:sp>
       <p:sp>
         <p:nvSpPr>
-          <p:cNvPr id="211" name="Google Shape;211;g2c48598d1a9_3_5:notes"/>
+          <p:cNvPr id="218" name="Google Shape;218;g2c48598d1a9_3_5:notes"/>
           <p:cNvSpPr txBox="1"/>
           <p:nvPr>
             <p:ph idx="1" type="body"/>
@@ -1684,105 +1784,6 @@
             <a:endParaRPr/>
           </a:p>
         </p:txBody>
-      </p:sp>
-    </p:spTree>
-  </p:cSld>
-  <p:clrMapOvr>
-    <a:masterClrMapping/>
-  </p:clrMapOvr>
-</p:notes>
-</file>
-
-<file path=ppt/notesSlides/notesSlide19.xml><?xml version="1.0" encoding="utf-8"?>
-<p:notes xmlns:a="http://schemas.openxmlformats.org/drawingml/2006/main" xmlns:r="http://schemas.openxmlformats.org/officeDocument/2006/relationships" xmlns:mc="http://schemas.openxmlformats.org/markup-compatibility/2006" xmlns:mv="urn:schemas-microsoft-com:mac:vml" xmlns:p="http://schemas.openxmlformats.org/presentationml/2006/main" xmlns:c="http://schemas.openxmlformats.org/drawingml/2006/chart" xmlns:dgm="http://schemas.openxmlformats.org/drawingml/2006/diagram" xmlns:o="urn:schemas-microsoft-com:office:office" xmlns:v="urn:schemas-microsoft-com:vml" xmlns:pvml="urn:schemas-microsoft-com:office:powerpoint" xmlns:com="http://schemas.openxmlformats.org/drawingml/2006/compatibility" xmlns:p14="http://schemas.microsoft.com/office/powerpoint/2010/main" xmlns:p15="http://schemas.microsoft.com/office/powerpoint/2012/main" xmlns:ahyp="http://schemas.microsoft.com/office/drawing/2018/hyperlinkcolor" showMasterPhAnim="0" showMasterSp="0">
-  <p:cSld>
-    <p:spTree>
-      <p:nvGrpSpPr>
-        <p:cNvPr id="215" name="Shape 215"/>
-        <p:cNvGrpSpPr/>
-        <p:nvPr/>
-      </p:nvGrpSpPr>
-      <p:grpSpPr>
-        <a:xfrm>
-          <a:off x="0" y="0"/>
-          <a:ext cx="0" cy="0"/>
-          <a:chOff x="0" y="0"/>
-          <a:chExt cx="0" cy="0"/>
-        </a:xfrm>
-      </p:grpSpPr>
-      <p:sp>
-        <p:nvSpPr>
-          <p:cNvPr id="216" name="Google Shape;216;p18:notes"/>
-          <p:cNvSpPr txBox="1"/>
-          <p:nvPr>
-            <p:ph idx="1" type="body"/>
-          </p:nvPr>
-        </p:nvSpPr>
-        <p:spPr>
-          <a:xfrm>
-            <a:off x="685800" y="4343400"/>
-            <a:ext cx="5486400" cy="4114800"/>
-          </a:xfrm>
-          <a:prstGeom prst="rect">
-            <a:avLst/>
-          </a:prstGeom>
-        </p:spPr>
-        <p:txBody>
-          <a:bodyPr anchorCtr="0" anchor="t" bIns="91425" lIns="91425" spcFirstLastPara="1" rIns="91425" wrap="square" tIns="91425">
-            <a:noAutofit/>
-          </a:bodyPr>
-          <a:lstStyle/>
-          <a:p>
-            <a:pPr indent="0" lvl="0" marL="0" rtl="0" algn="l">
-              <a:spcBef>
-                <a:spcPts val="0"/>
-              </a:spcBef>
-              <a:spcAft>
-                <a:spcPts val="0"/>
-              </a:spcAft>
-              <a:buNone/>
-            </a:pPr>
-            <a:r>
-              <a:t/>
-            </a:r>
-            <a:endParaRPr/>
-          </a:p>
-        </p:txBody>
-      </p:sp>
-      <p:sp>
-        <p:nvSpPr>
-          <p:cNvPr id="217" name="Google Shape;217;p18:notes"/>
-          <p:cNvSpPr/>
-          <p:nvPr>
-            <p:ph idx="2" type="sldImg"/>
-          </p:nvPr>
-        </p:nvSpPr>
-        <p:spPr>
-          <a:xfrm>
-            <a:off x="1143225" y="685800"/>
-            <a:ext cx="4572225" cy="3429000"/>
-          </a:xfrm>
-          <a:custGeom>
-            <a:rect b="b" l="l" r="r" t="t"/>
-            <a:pathLst>
-              <a:path extrusionOk="0" h="120000" w="120000">
-                <a:moveTo>
-                  <a:pt x="0" y="0"/>
-                </a:moveTo>
-                <a:lnTo>
-                  <a:pt x="120000" y="0"/>
-                </a:lnTo>
-                <a:lnTo>
-                  <a:pt x="120000" y="120000"/>
-                </a:lnTo>
-                <a:lnTo>
-                  <a:pt x="0" y="120000"/>
-                </a:lnTo>
-                <a:close/>
-              </a:path>
-            </a:pathLst>
-          </a:custGeom>
-        </p:spPr>
       </p:sp>
     </p:spTree>
   </p:cSld>
@@ -1896,7 +1897,7 @@
   <p:cSld>
     <p:spTree>
       <p:nvGrpSpPr>
-        <p:cNvPr id="222" name="Shape 222"/>
+        <p:cNvPr id="223" name="Shape 223"/>
         <p:cNvGrpSpPr/>
         <p:nvPr/>
       </p:nvGrpSpPr>
@@ -1910,7 +1911,7 @@
       </p:grpSpPr>
       <p:sp>
         <p:nvSpPr>
-          <p:cNvPr id="223" name="Google Shape;223;p17:notes"/>
+          <p:cNvPr id="224" name="Google Shape;224;p18:notes"/>
           <p:cNvSpPr txBox="1"/>
           <p:nvPr>
             <p:ph idx="1" type="body"/>
@@ -1949,7 +1950,7 @@
       </p:sp>
       <p:sp>
         <p:nvSpPr>
-          <p:cNvPr id="224" name="Google Shape;224;p17:notes"/>
+          <p:cNvPr id="225" name="Google Shape;225;p18:notes"/>
           <p:cNvSpPr/>
           <p:nvPr>
             <p:ph idx="2" type="sldImg"/>
@@ -1995,7 +1996,7 @@
   <p:cSld>
     <p:spTree>
       <p:nvGrpSpPr>
-        <p:cNvPr id="229" name="Shape 229"/>
+        <p:cNvPr id="230" name="Shape 230"/>
         <p:cNvGrpSpPr/>
         <p:nvPr/>
       </p:nvGrpSpPr>
@@ -2009,7 +2010,7 @@
       </p:grpSpPr>
       <p:sp>
         <p:nvSpPr>
-          <p:cNvPr id="230" name="Google Shape;230;p24:notes"/>
+          <p:cNvPr id="231" name="Google Shape;231;p17:notes"/>
           <p:cNvSpPr txBox="1"/>
           <p:nvPr>
             <p:ph idx="1" type="body"/>
@@ -2048,7 +2049,7 @@
       </p:sp>
       <p:sp>
         <p:nvSpPr>
-          <p:cNvPr id="231" name="Google Shape;231;p24:notes"/>
+          <p:cNvPr id="232" name="Google Shape;232;p17:notes"/>
           <p:cNvSpPr/>
           <p:nvPr>
             <p:ph idx="2" type="sldImg"/>
@@ -2094,7 +2095,7 @@
   <p:cSld>
     <p:spTree>
       <p:nvGrpSpPr>
-        <p:cNvPr id="235" name="Shape 235"/>
+        <p:cNvPr id="237" name="Shape 237"/>
         <p:cNvGrpSpPr/>
         <p:nvPr/>
       </p:nvGrpSpPr>
@@ -2108,7 +2109,7 @@
       </p:grpSpPr>
       <p:sp>
         <p:nvSpPr>
-          <p:cNvPr id="236" name="Google Shape;236;p25:notes"/>
+          <p:cNvPr id="238" name="Google Shape;238;p24:notes"/>
           <p:cNvSpPr txBox="1"/>
           <p:nvPr>
             <p:ph idx="1" type="body"/>
@@ -2147,7 +2148,106 @@
       </p:sp>
       <p:sp>
         <p:nvSpPr>
-          <p:cNvPr id="237" name="Google Shape;237;p25:notes"/>
+          <p:cNvPr id="239" name="Google Shape;239;p24:notes"/>
+          <p:cNvSpPr/>
+          <p:nvPr>
+            <p:ph idx="2" type="sldImg"/>
+          </p:nvPr>
+        </p:nvSpPr>
+        <p:spPr>
+          <a:xfrm>
+            <a:off x="1143225" y="685800"/>
+            <a:ext cx="4572225" cy="3429000"/>
+          </a:xfrm>
+          <a:custGeom>
+            <a:rect b="b" l="l" r="r" t="t"/>
+            <a:pathLst>
+              <a:path extrusionOk="0" h="120000" w="120000">
+                <a:moveTo>
+                  <a:pt x="0" y="0"/>
+                </a:moveTo>
+                <a:lnTo>
+                  <a:pt x="120000" y="0"/>
+                </a:lnTo>
+                <a:lnTo>
+                  <a:pt x="120000" y="120000"/>
+                </a:lnTo>
+                <a:lnTo>
+                  <a:pt x="0" y="120000"/>
+                </a:lnTo>
+                <a:close/>
+              </a:path>
+            </a:pathLst>
+          </a:custGeom>
+        </p:spPr>
+      </p:sp>
+    </p:spTree>
+  </p:cSld>
+  <p:clrMapOvr>
+    <a:masterClrMapping/>
+  </p:clrMapOvr>
+</p:notes>
+</file>
+
+<file path=ppt/notesSlides/notesSlide23.xml><?xml version="1.0" encoding="utf-8"?>
+<p:notes xmlns:a="http://schemas.openxmlformats.org/drawingml/2006/main" xmlns:r="http://schemas.openxmlformats.org/officeDocument/2006/relationships" xmlns:mc="http://schemas.openxmlformats.org/markup-compatibility/2006" xmlns:mv="urn:schemas-microsoft-com:mac:vml" xmlns:p="http://schemas.openxmlformats.org/presentationml/2006/main" xmlns:c="http://schemas.openxmlformats.org/drawingml/2006/chart" xmlns:dgm="http://schemas.openxmlformats.org/drawingml/2006/diagram" xmlns:o="urn:schemas-microsoft-com:office:office" xmlns:v="urn:schemas-microsoft-com:vml" xmlns:pvml="urn:schemas-microsoft-com:office:powerpoint" xmlns:com="http://schemas.openxmlformats.org/drawingml/2006/compatibility" xmlns:p14="http://schemas.microsoft.com/office/powerpoint/2010/main" xmlns:p15="http://schemas.microsoft.com/office/powerpoint/2012/main" xmlns:ahyp="http://schemas.microsoft.com/office/drawing/2018/hyperlinkcolor" showMasterPhAnim="0" showMasterSp="0">
+  <p:cSld>
+    <p:spTree>
+      <p:nvGrpSpPr>
+        <p:cNvPr id="243" name="Shape 243"/>
+        <p:cNvGrpSpPr/>
+        <p:nvPr/>
+      </p:nvGrpSpPr>
+      <p:grpSpPr>
+        <a:xfrm>
+          <a:off x="0" y="0"/>
+          <a:ext cx="0" cy="0"/>
+          <a:chOff x="0" y="0"/>
+          <a:chExt cx="0" cy="0"/>
+        </a:xfrm>
+      </p:grpSpPr>
+      <p:sp>
+        <p:nvSpPr>
+          <p:cNvPr id="244" name="Google Shape;244;p25:notes"/>
+          <p:cNvSpPr txBox="1"/>
+          <p:nvPr>
+            <p:ph idx="1" type="body"/>
+          </p:nvPr>
+        </p:nvSpPr>
+        <p:spPr>
+          <a:xfrm>
+            <a:off x="685800" y="4343400"/>
+            <a:ext cx="5486400" cy="4114800"/>
+          </a:xfrm>
+          <a:prstGeom prst="rect">
+            <a:avLst/>
+          </a:prstGeom>
+        </p:spPr>
+        <p:txBody>
+          <a:bodyPr anchorCtr="0" anchor="t" bIns="91425" lIns="91425" spcFirstLastPara="1" rIns="91425" wrap="square" tIns="91425">
+            <a:noAutofit/>
+          </a:bodyPr>
+          <a:lstStyle/>
+          <a:p>
+            <a:pPr indent="0" lvl="0" marL="0" rtl="0" algn="l">
+              <a:spcBef>
+                <a:spcPts val="0"/>
+              </a:spcBef>
+              <a:spcAft>
+                <a:spcPts val="0"/>
+              </a:spcAft>
+              <a:buNone/>
+            </a:pPr>
+            <a:r>
+              <a:t/>
+            </a:r>
+            <a:endParaRPr/>
+          </a:p>
+        </p:txBody>
+      </p:sp>
+      <p:sp>
+        <p:nvSpPr>
+          <p:cNvPr id="245" name="Google Shape;245;p25:notes"/>
           <p:cNvSpPr/>
           <p:nvPr>
             <p:ph idx="2" type="sldImg"/>
@@ -13162,7 +13262,7 @@
         </p:nvSpPr>
         <p:spPr>
           <a:xfrm>
-            <a:off x="1581950" y="3308925"/>
+            <a:off x="2386775" y="3263575"/>
             <a:ext cx="1875300" cy="2862900"/>
           </a:xfrm>
           <a:prstGeom prst="rect">
@@ -13179,7 +13279,7 @@
           </a:bodyPr>
           <a:lstStyle/>
           <a:p>
-            <a:pPr indent="0" lvl="0" marL="0" marR="0" rtl="0" algn="l">
+            <a:pPr indent="0" lvl="0" marL="0" marR="0" rtl="0" algn="ctr">
               <a:spcBef>
                 <a:spcPts val="0"/>
               </a:spcBef>
@@ -13223,7 +13323,7 @@
             </a:endParaRPr>
           </a:p>
           <a:p>
-            <a:pPr indent="0" lvl="0" marL="0" marR="0" rtl="0" algn="l">
+            <a:pPr indent="0" lvl="0" marL="0" marR="0" rtl="0" algn="ctr">
               <a:spcBef>
                 <a:spcPts val="0"/>
               </a:spcBef>
@@ -13246,7 +13346,7 @@
             </a:endParaRPr>
           </a:p>
           <a:p>
-            <a:pPr indent="0" lvl="0" marL="0" marR="0" rtl="0" algn="l">
+            <a:pPr indent="0" lvl="0" marL="0" marR="0" rtl="0" algn="ctr">
               <a:spcBef>
                 <a:spcPts val="0"/>
               </a:spcBef>
@@ -13278,7 +13378,7 @@
             </a:endParaRPr>
           </a:p>
           <a:p>
-            <a:pPr indent="0" lvl="0" marL="0" marR="0" rtl="0" algn="l">
+            <a:pPr indent="0" lvl="0" marL="0" marR="0" rtl="0" algn="ctr">
               <a:spcBef>
                 <a:spcPts val="0"/>
               </a:spcBef>
@@ -13310,7 +13410,7 @@
             </a:endParaRPr>
           </a:p>
           <a:p>
-            <a:pPr indent="0" lvl="0" marL="0" marR="0" rtl="0" algn="l">
+            <a:pPr indent="0" lvl="0" marL="0" marR="0" rtl="0" algn="ctr">
               <a:spcBef>
                 <a:spcPts val="0"/>
               </a:spcBef>
@@ -13342,7 +13442,7 @@
             </a:endParaRPr>
           </a:p>
           <a:p>
-            <a:pPr indent="0" lvl="0" marL="0" marR="0" rtl="0" algn="l">
+            <a:pPr indent="0" lvl="0" marL="0" marR="0" rtl="0" algn="ctr">
               <a:spcBef>
                 <a:spcPts val="0"/>
               </a:spcBef>
@@ -13374,7 +13474,7 @@
             </a:endParaRPr>
           </a:p>
           <a:p>
-            <a:pPr indent="0" lvl="0" marL="0" marR="0" rtl="0" algn="l">
+            <a:pPr indent="0" lvl="0" marL="0" marR="0" rtl="0" algn="ctr">
               <a:spcBef>
                 <a:spcPts val="0"/>
               </a:spcBef>
@@ -13406,7 +13506,7 @@
             </a:endParaRPr>
           </a:p>
           <a:p>
-            <a:pPr indent="0" lvl="0" marL="0" marR="0" rtl="0" algn="l">
+            <a:pPr indent="0" lvl="0" marL="0" marR="0" rtl="0" algn="ctr">
               <a:spcBef>
                 <a:spcPts val="0"/>
               </a:spcBef>
@@ -13438,7 +13538,7 @@
             </a:endParaRPr>
           </a:p>
           <a:p>
-            <a:pPr indent="0" lvl="0" marL="0" marR="0" rtl="0" algn="l">
+            <a:pPr indent="0" lvl="0" marL="0" marR="0" rtl="0" algn="ctr">
               <a:spcBef>
                 <a:spcPts val="0"/>
               </a:spcBef>
@@ -13470,7 +13570,7 @@
             </a:endParaRPr>
           </a:p>
           <a:p>
-            <a:pPr indent="0" lvl="0" marL="0" marR="0" rtl="0" algn="l">
+            <a:pPr indent="0" lvl="0" marL="0" marR="0" rtl="0" algn="ctr">
               <a:spcBef>
                 <a:spcPts val="0"/>
               </a:spcBef>
@@ -13519,8 +13619,8 @@
         </p:blipFill>
         <p:spPr>
           <a:xfrm>
-            <a:off x="5067000" y="3234975"/>
-            <a:ext cx="3010801" cy="3010801"/>
+            <a:off x="5933450" y="3108613"/>
+            <a:ext cx="3263524" cy="3263524"/>
           </a:xfrm>
           <a:prstGeom prst="rect">
             <a:avLst/>
@@ -14556,17 +14656,18 @@
           <p:cNvPicPr preferRelativeResize="0"/>
           <p:nvPr/>
         </p:nvPicPr>
-        <p:blipFill rotWithShape="1">
+        <p:blipFill>
           <a:blip r:embed="rId3">
             <a:alphaModFix/>
           </a:blip>
-          <a:srcRect b="0" l="0" r="0" t="0"/>
-          <a:stretch/>
+          <a:stretch>
+            <a:fillRect/>
+          </a:stretch>
         </p:blipFill>
         <p:spPr>
           <a:xfrm>
-            <a:off x="1697037" y="1838325"/>
-            <a:ext cx="8391525" cy="5019675"/>
+            <a:off x="2188900" y="1885781"/>
+            <a:ext cx="8071235" cy="4837244"/>
           </a:xfrm>
           <a:prstGeom prst="rect">
             <a:avLst/>
@@ -15007,7 +15108,144 @@
       </p:grpSpPr>
       <p:sp>
         <p:nvSpPr>
-          <p:cNvPr id="207" name="Google Shape;207;p22"/>
+          <p:cNvPr id="207" name="Google Shape;207;g2c4b658579b_0_3"/>
+          <p:cNvSpPr txBox="1"/>
+          <p:nvPr>
+            <p:ph type="title"/>
+          </p:nvPr>
+        </p:nvSpPr>
+        <p:spPr>
+          <a:xfrm>
+            <a:off x="581200" y="702153"/>
+            <a:ext cx="11029500" cy="533700"/>
+          </a:xfrm>
+          <a:prstGeom prst="rect">
+            <a:avLst/>
+          </a:prstGeom>
+        </p:spPr>
+        <p:txBody>
+          <a:bodyPr anchorCtr="0" anchor="b" bIns="45700" lIns="91425" spcFirstLastPara="1" rIns="91425" wrap="square" tIns="45700">
+            <a:normAutofit/>
+          </a:bodyPr>
+          <a:lstStyle/>
+          <a:p>
+            <a:pPr indent="0" lvl="0" marL="0" rtl="0" algn="l">
+              <a:spcBef>
+                <a:spcPts val="0"/>
+              </a:spcBef>
+              <a:spcAft>
+                <a:spcPts val="0"/>
+              </a:spcAft>
+              <a:buClr>
+                <a:schemeClr val="lt1"/>
+              </a:buClr>
+              <a:buSzPts val="2800"/>
+              <a:buFont typeface="Gill Sans"/>
+              <a:buNone/>
+            </a:pPr>
+            <a:r>
+              <a:rPr lang="en-US"/>
+              <a:t>WHAT IS THE RETURN ON INVESTMENT?</a:t>
+            </a:r>
+            <a:endParaRPr/>
+          </a:p>
+        </p:txBody>
+      </p:sp>
+      <p:sp>
+        <p:nvSpPr>
+          <p:cNvPr id="208" name="Google Shape;208;g2c4b658579b_0_3"/>
+          <p:cNvSpPr txBox="1"/>
+          <p:nvPr>
+            <p:ph idx="1" type="body"/>
+          </p:nvPr>
+        </p:nvSpPr>
+        <p:spPr>
+          <a:xfrm>
+            <a:off x="581192" y="2180496"/>
+            <a:ext cx="11029500" cy="3678300"/>
+          </a:xfrm>
+          <a:prstGeom prst="rect">
+            <a:avLst/>
+          </a:prstGeom>
+        </p:spPr>
+        <p:txBody>
+          <a:bodyPr anchorCtr="0" anchor="ctr" bIns="45700" lIns="91425" spcFirstLastPara="1" rIns="91425" wrap="square" tIns="45700">
+            <a:normAutofit/>
+          </a:bodyPr>
+          <a:lstStyle/>
+          <a:p>
+            <a:pPr indent="0" lvl="0" marL="0" rtl="0" algn="l">
+              <a:spcBef>
+                <a:spcPts val="360"/>
+              </a:spcBef>
+              <a:spcAft>
+                <a:spcPts val="600"/>
+              </a:spcAft>
+              <a:buNone/>
+            </a:pPr>
+            <a:r>
+              <a:t/>
+            </a:r>
+            <a:endParaRPr/>
+          </a:p>
+        </p:txBody>
+      </p:sp>
+      <p:pic>
+        <p:nvPicPr>
+          <p:cNvPr id="209" name="Google Shape;209;g2c4b658579b_0_3"/>
+          <p:cNvPicPr preferRelativeResize="0"/>
+          <p:nvPr/>
+        </p:nvPicPr>
+        <p:blipFill>
+          <a:blip r:embed="rId3">
+            <a:alphaModFix/>
+          </a:blip>
+          <a:stretch>
+            <a:fillRect/>
+          </a:stretch>
+        </p:blipFill>
+        <p:spPr>
+          <a:xfrm>
+            <a:off x="433988" y="1345859"/>
+            <a:ext cx="11323925" cy="5858900"/>
+          </a:xfrm>
+          <a:prstGeom prst="rect">
+            <a:avLst/>
+          </a:prstGeom>
+          <a:noFill/>
+          <a:ln>
+            <a:noFill/>
+          </a:ln>
+        </p:spPr>
+      </p:pic>
+    </p:spTree>
+  </p:cSld>
+  <p:clrMapOvr>
+    <a:masterClrMapping/>
+  </p:clrMapOvr>
+</p:sld>
+</file>
+
+<file path=ppt/slides/slide18.xml><?xml version="1.0" encoding="utf-8"?>
+<p:sld xmlns:a="http://schemas.openxmlformats.org/drawingml/2006/main" xmlns:r="http://schemas.openxmlformats.org/officeDocument/2006/relationships" xmlns:mc="http://schemas.openxmlformats.org/markup-compatibility/2006" xmlns:mv="urn:schemas-microsoft-com:mac:vml" xmlns:p="http://schemas.openxmlformats.org/presentationml/2006/main" xmlns:c="http://schemas.openxmlformats.org/drawingml/2006/chart" xmlns:dgm="http://schemas.openxmlformats.org/drawingml/2006/diagram" xmlns:o="urn:schemas-microsoft-com:office:office" xmlns:v="urn:schemas-microsoft-com:vml" xmlns:pvml="urn:schemas-microsoft-com:office:powerpoint" xmlns:com="http://schemas.openxmlformats.org/drawingml/2006/compatibility" xmlns:p14="http://schemas.microsoft.com/office/powerpoint/2010/main" xmlns:p15="http://schemas.microsoft.com/office/powerpoint/2012/main" xmlns:ahyp="http://schemas.microsoft.com/office/drawing/2018/hyperlinkcolor">
+  <p:cSld>
+    <p:spTree>
+      <p:nvGrpSpPr>
+        <p:cNvPr id="213" name="Shape 213"/>
+        <p:cNvGrpSpPr/>
+        <p:nvPr/>
+      </p:nvGrpSpPr>
+      <p:grpSpPr>
+        <a:xfrm>
+          <a:off x="0" y="0"/>
+          <a:ext cx="0" cy="0"/>
+          <a:chOff x="0" y="0"/>
+          <a:chExt cx="0" cy="0"/>
+        </a:xfrm>
+      </p:grpSpPr>
+      <p:sp>
+        <p:nvSpPr>
+          <p:cNvPr id="214" name="Google Shape;214;p22"/>
           <p:cNvSpPr txBox="1"/>
           <p:nvPr>
             <p:ph type="title"/>
@@ -15056,7 +15294,7 @@
       </p:sp>
       <p:pic>
         <p:nvPicPr>
-          <p:cNvPr id="208" name="Google Shape;208;p22"/>
+          <p:cNvPr id="215" name="Google Shape;215;p22"/>
           <p:cNvPicPr preferRelativeResize="0"/>
           <p:nvPr>
             <p:ph idx="1" type="body"/>
@@ -15091,12 +15329,12 @@
 </p:sld>
 </file>
 
-<file path=ppt/slides/slide18.xml><?xml version="1.0" encoding="utf-8"?>
+<file path=ppt/slides/slide19.xml><?xml version="1.0" encoding="utf-8"?>
 <p:sld xmlns:a="http://schemas.openxmlformats.org/drawingml/2006/main" xmlns:r="http://schemas.openxmlformats.org/officeDocument/2006/relationships" xmlns:mc="http://schemas.openxmlformats.org/markup-compatibility/2006" xmlns:mv="urn:schemas-microsoft-com:mac:vml" xmlns:p="http://schemas.openxmlformats.org/presentationml/2006/main" xmlns:c="http://schemas.openxmlformats.org/drawingml/2006/chart" xmlns:dgm="http://schemas.openxmlformats.org/drawingml/2006/diagram" xmlns:o="urn:schemas-microsoft-com:office:office" xmlns:v="urn:schemas-microsoft-com:vml" xmlns:pvml="urn:schemas-microsoft-com:office:powerpoint" xmlns:com="http://schemas.openxmlformats.org/drawingml/2006/compatibility" xmlns:p14="http://schemas.microsoft.com/office/powerpoint/2010/main" xmlns:p15="http://schemas.microsoft.com/office/powerpoint/2012/main" xmlns:ahyp="http://schemas.microsoft.com/office/drawing/2018/hyperlinkcolor">
   <p:cSld>
     <p:spTree>
       <p:nvGrpSpPr>
-        <p:cNvPr id="212" name="Shape 212"/>
+        <p:cNvPr id="219" name="Shape 219"/>
         <p:cNvGrpSpPr/>
         <p:nvPr/>
       </p:nvGrpSpPr>
@@ -15110,7 +15348,7 @@
       </p:grpSpPr>
       <p:sp>
         <p:nvSpPr>
-          <p:cNvPr id="213" name="Google Shape;213;g2c48598d1a9_3_5"/>
+          <p:cNvPr id="220" name="Google Shape;220;g2c48598d1a9_3_5"/>
           <p:cNvSpPr txBox="1"/>
           <p:nvPr>
             <p:ph type="title"/>
@@ -15153,136 +15391,24 @@
           </a:p>
         </p:txBody>
       </p:sp>
-      <p:sp>
-        <p:nvSpPr>
-          <p:cNvPr id="214" name="Google Shape;214;g2c48598d1a9_3_5"/>
-          <p:cNvSpPr txBox="1"/>
-          <p:nvPr>
-            <p:ph idx="1" type="body"/>
-          </p:nvPr>
-        </p:nvSpPr>
-        <p:spPr>
-          <a:xfrm>
-            <a:off x="581192" y="2180496"/>
-            <a:ext cx="11029500" cy="3678300"/>
-          </a:xfrm>
-          <a:prstGeom prst="rect">
-            <a:avLst/>
-          </a:prstGeom>
-        </p:spPr>
-        <p:txBody>
-          <a:bodyPr anchorCtr="0" anchor="ctr" bIns="45700" lIns="91425" spcFirstLastPara="1" rIns="91425" wrap="square" tIns="45700">
-            <a:normAutofit/>
-          </a:bodyPr>
-          <a:lstStyle/>
-          <a:p>
-            <a:pPr indent="0" lvl="0" marL="0" rtl="0" algn="l">
-              <a:spcBef>
-                <a:spcPts val="360"/>
-              </a:spcBef>
-              <a:spcAft>
-                <a:spcPts val="600"/>
-              </a:spcAft>
-              <a:buNone/>
-            </a:pPr>
-            <a:r>
-              <a:t/>
-            </a:r>
-            <a:endParaRPr/>
-          </a:p>
-        </p:txBody>
-      </p:sp>
-    </p:spTree>
-  </p:cSld>
-  <p:clrMapOvr>
-    <a:masterClrMapping/>
-  </p:clrMapOvr>
-</p:sld>
-</file>
-
-<file path=ppt/slides/slide19.xml><?xml version="1.0" encoding="utf-8"?>
-<p:sld xmlns:a="http://schemas.openxmlformats.org/drawingml/2006/main" xmlns:r="http://schemas.openxmlformats.org/officeDocument/2006/relationships" xmlns:mc="http://schemas.openxmlformats.org/markup-compatibility/2006" xmlns:mv="urn:schemas-microsoft-com:mac:vml" xmlns:p="http://schemas.openxmlformats.org/presentationml/2006/main" xmlns:c="http://schemas.openxmlformats.org/drawingml/2006/chart" xmlns:dgm="http://schemas.openxmlformats.org/drawingml/2006/diagram" xmlns:o="urn:schemas-microsoft-com:office:office" xmlns:v="urn:schemas-microsoft-com:vml" xmlns:pvml="urn:schemas-microsoft-com:office:powerpoint" xmlns:com="http://schemas.openxmlformats.org/drawingml/2006/compatibility" xmlns:p14="http://schemas.microsoft.com/office/powerpoint/2010/main" xmlns:p15="http://schemas.microsoft.com/office/powerpoint/2012/main" xmlns:ahyp="http://schemas.microsoft.com/office/drawing/2018/hyperlinkcolor">
-  <p:cSld>
-    <p:spTree>
-      <p:nvGrpSpPr>
-        <p:cNvPr id="218" name="Shape 218"/>
-        <p:cNvGrpSpPr/>
-        <p:nvPr/>
-      </p:nvGrpSpPr>
-      <p:grpSpPr>
-        <a:xfrm>
-          <a:off x="0" y="0"/>
-          <a:ext cx="0" cy="0"/>
-          <a:chOff x="0" y="0"/>
-          <a:chExt cx="0" cy="0"/>
-        </a:xfrm>
-      </p:grpSpPr>
-      <p:sp>
-        <p:nvSpPr>
-          <p:cNvPr id="219" name="Google Shape;219;p18"/>
-          <p:cNvSpPr txBox="1"/>
-          <p:nvPr>
-            <p:ph type="title"/>
-          </p:nvPr>
-        </p:nvSpPr>
-        <p:spPr>
-          <a:xfrm>
-            <a:off x="581192" y="702156"/>
-            <a:ext cx="11029616" cy="1013800"/>
-          </a:xfrm>
-          <a:prstGeom prst="rect">
-            <a:avLst/>
-          </a:prstGeom>
-          <a:noFill/>
-          <a:ln>
-            <a:noFill/>
-          </a:ln>
-        </p:spPr>
-        <p:txBody>
-          <a:bodyPr anchorCtr="0" anchor="b" bIns="45700" lIns="91425" spcFirstLastPara="1" rIns="91425" wrap="square" tIns="45700">
-            <a:normAutofit/>
-          </a:bodyPr>
-          <a:lstStyle/>
-          <a:p>
-            <a:pPr indent="0" lvl="0" marL="0" rtl="0" algn="l">
-              <a:spcBef>
-                <a:spcPts val="0"/>
-              </a:spcBef>
-              <a:spcAft>
-                <a:spcPts val="0"/>
-              </a:spcAft>
-              <a:buClr>
-                <a:schemeClr val="lt1"/>
-              </a:buClr>
-              <a:buSzPts val="2800"/>
-              <a:buFont typeface="Gill Sans"/>
-              <a:buNone/>
-            </a:pPr>
-            <a:r>
-              <a:rPr lang="en-US"/>
-              <a:t>ARE THERE ANY OTHER FACTORS THAT CAN INFLUENCE OUR DECISION?</a:t>
-            </a:r>
-            <a:endParaRPr/>
-          </a:p>
-        </p:txBody>
-      </p:sp>
       <p:pic>
         <p:nvPicPr>
-          <p:cNvPr id="220" name="Google Shape;220;p18"/>
+          <p:cNvPr id="221" name="Google Shape;221;g2c48598d1a9_3_5"/>
           <p:cNvPicPr preferRelativeResize="0"/>
           <p:nvPr/>
         </p:nvPicPr>
-        <p:blipFill rotWithShape="1">
+        <p:blipFill>
           <a:blip r:embed="rId3">
             <a:alphaModFix/>
           </a:blip>
-          <a:srcRect b="0" l="0" r="0" t="0"/>
-          <a:stretch/>
+          <a:stretch>
+            <a:fillRect/>
+          </a:stretch>
         </p:blipFill>
         <p:spPr>
           <a:xfrm>
-            <a:off x="473690" y="1900012"/>
-            <a:ext cx="7536220" cy="4778851"/>
+            <a:off x="417176" y="1815451"/>
+            <a:ext cx="8198851" cy="4939675"/>
           </a:xfrm>
           <a:prstGeom prst="rect">
             <a:avLst/>
@@ -15295,14 +15421,14 @@
       </p:pic>
       <p:sp>
         <p:nvSpPr>
-          <p:cNvPr id="221" name="Google Shape;221;p18"/>
+          <p:cNvPr id="222" name="Google Shape;222;g2c48598d1a9_3_5"/>
           <p:cNvSpPr txBox="1"/>
           <p:nvPr/>
         </p:nvSpPr>
         <p:spPr>
           <a:xfrm>
-            <a:off x="8009910" y="2120900"/>
-            <a:ext cx="2750700" cy="2586000"/>
+            <a:off x="8616025" y="2140925"/>
+            <a:ext cx="3081000" cy="3786600"/>
           </a:xfrm>
           <a:prstGeom prst="rect">
             <a:avLst/>
@@ -15313,12 +15439,12 @@
           </a:ln>
         </p:spPr>
         <p:txBody>
-          <a:bodyPr anchorCtr="0" anchor="t" bIns="45700" lIns="91425" spcFirstLastPara="1" rIns="91425" wrap="square" tIns="45700">
+          <a:bodyPr anchorCtr="0" anchor="t" bIns="91425" lIns="91425" spcFirstLastPara="1" rIns="91425" wrap="square" tIns="91425">
             <a:spAutoFit/>
           </a:bodyPr>
           <a:lstStyle/>
           <a:p>
-            <a:pPr indent="0" lvl="0" marL="0" marR="0" rtl="0" algn="l">
+            <a:pPr indent="0" lvl="0" marL="0" rtl="0" algn="l">
               <a:spcBef>
                 <a:spcPts val="0"/>
               </a:spcBef>
@@ -15328,35 +15454,20 @@
               <a:buNone/>
             </a:pPr>
             <a:r>
-              <a:rPr lang="en-US" sz="1800">
+              <a:rPr lang="en-US" sz="1800" u="sng">
                 <a:solidFill>
-                  <a:schemeClr val="dk1"/>
+                  <a:schemeClr val="dk2"/>
                 </a:solidFill>
                 <a:latin typeface="Gill Sans"/>
                 <a:ea typeface="Gill Sans"/>
                 <a:cs typeface="Gill Sans"/>
                 <a:sym typeface="Gill Sans"/>
               </a:rPr>
-              <a:t>Correlation Co – efficients:</a:t>
+              <a:t>Assumptions:</a:t>
             </a:r>
-            <a:endParaRPr/>
-          </a:p>
-          <a:p>
-            <a:pPr indent="0" lvl="0" marL="0" marR="0" rtl="0" algn="l">
-              <a:spcBef>
-                <a:spcPts val="0"/>
-              </a:spcBef>
-              <a:spcAft>
-                <a:spcPts val="0"/>
-              </a:spcAft>
-              <a:buNone/>
-            </a:pPr>
-            <a:r>
-              <a:t/>
-            </a:r>
-            <a:endParaRPr sz="1800">
+            <a:endParaRPr sz="1800" u="sng">
               <a:solidFill>
-                <a:schemeClr val="dk1"/>
+                <a:schemeClr val="dk2"/>
               </a:solidFill>
               <a:latin typeface="Gill Sans"/>
               <a:ea typeface="Gill Sans"/>
@@ -15365,31 +15476,7 @@
             </a:endParaRPr>
           </a:p>
           <a:p>
-            <a:pPr indent="0" lvl="0" marL="0" marR="0" rtl="0" algn="l">
-              <a:spcBef>
-                <a:spcPts val="0"/>
-              </a:spcBef>
-              <a:spcAft>
-                <a:spcPts val="0"/>
-              </a:spcAft>
-              <a:buNone/>
-            </a:pPr>
-            <a:r>
-              <a:rPr lang="en-US" sz="1800">
-                <a:solidFill>
-                  <a:schemeClr val="dk1"/>
-                </a:solidFill>
-                <a:latin typeface="Gill Sans"/>
-                <a:ea typeface="Gill Sans"/>
-                <a:cs typeface="Gill Sans"/>
-                <a:sym typeface="Gill Sans"/>
-              </a:rPr>
-              <a:t>Walmart: -0.077</a:t>
-            </a:r>
-            <a:endParaRPr/>
-          </a:p>
-          <a:p>
-            <a:pPr indent="0" lvl="0" marL="0" marR="0" rtl="0" algn="l">
+            <a:pPr indent="0" lvl="0" marL="0" rtl="0" algn="l">
               <a:spcBef>
                 <a:spcPts val="0"/>
               </a:spcBef>
@@ -15401,9 +15488,9 @@
             <a:r>
               <a:t/>
             </a:r>
-            <a:endParaRPr sz="1800">
+            <a:endParaRPr sz="1800" u="sng">
               <a:solidFill>
-                <a:schemeClr val="dk1"/>
+                <a:schemeClr val="dk2"/>
               </a:solidFill>
               <a:latin typeface="Gill Sans"/>
               <a:ea typeface="Gill Sans"/>
@@ -15412,7 +15499,7 @@
             </a:endParaRPr>
           </a:p>
           <a:p>
-            <a:pPr indent="0" lvl="0" marL="0" marR="0" rtl="0" algn="l">
+            <a:pPr indent="0" lvl="0" marL="0" rtl="0" algn="l">
               <a:spcBef>
                 <a:spcPts val="0"/>
               </a:spcBef>
@@ -15424,33 +15511,18 @@
             <a:r>
               <a:rPr lang="en-US" sz="1800">
                 <a:solidFill>
-                  <a:schemeClr val="dk1"/>
+                  <a:schemeClr val="dk2"/>
                 </a:solidFill>
                 <a:latin typeface="Gill Sans"/>
                 <a:ea typeface="Gill Sans"/>
                 <a:cs typeface="Gill Sans"/>
                 <a:sym typeface="Gill Sans"/>
               </a:rPr>
-              <a:t>Costco:  -0.151</a:t>
-            </a:r>
-            <a:endParaRPr/>
-          </a:p>
-          <a:p>
-            <a:pPr indent="0" lvl="0" marL="0" marR="0" rtl="0" algn="l">
-              <a:spcBef>
-                <a:spcPts val="0"/>
-              </a:spcBef>
-              <a:spcAft>
-                <a:spcPts val="0"/>
-              </a:spcAft>
-              <a:buNone/>
-            </a:pPr>
-            <a:r>
-              <a:t/>
+              <a:t>$1000 worth of stock was invested using the original opening price - and used to calculate the number of shares held.</a:t>
             </a:r>
             <a:endParaRPr sz="1800">
               <a:solidFill>
-                <a:schemeClr val="dk1"/>
+                <a:schemeClr val="dk2"/>
               </a:solidFill>
               <a:latin typeface="Gill Sans"/>
               <a:ea typeface="Gill Sans"/>
@@ -15459,31 +15531,7 @@
             </a:endParaRPr>
           </a:p>
           <a:p>
-            <a:pPr indent="0" lvl="0" marL="0" marR="0" rtl="0" algn="l">
-              <a:spcBef>
-                <a:spcPts val="0"/>
-              </a:spcBef>
-              <a:spcAft>
-                <a:spcPts val="0"/>
-              </a:spcAft>
-              <a:buNone/>
-            </a:pPr>
-            <a:r>
-              <a:rPr lang="en-US" sz="1800">
-                <a:solidFill>
-                  <a:schemeClr val="dk1"/>
-                </a:solidFill>
-                <a:latin typeface="Gill Sans"/>
-                <a:ea typeface="Gill Sans"/>
-                <a:cs typeface="Gill Sans"/>
-                <a:sym typeface="Gill Sans"/>
-              </a:rPr>
-              <a:t>Target: -0.272</a:t>
-            </a:r>
-            <a:endParaRPr/>
-          </a:p>
-          <a:p>
-            <a:pPr indent="0" lvl="0" marL="0" marR="0" rtl="0" algn="l">
+            <a:pPr indent="0" lvl="0" marL="0" rtl="0" algn="l">
               <a:spcBef>
                 <a:spcPts val="0"/>
               </a:spcBef>
@@ -15497,7 +15545,7 @@
             </a:r>
             <a:endParaRPr sz="1800">
               <a:solidFill>
-                <a:schemeClr val="dk1"/>
+                <a:schemeClr val="dk2"/>
               </a:solidFill>
               <a:latin typeface="Gill Sans"/>
               <a:ea typeface="Gill Sans"/>
@@ -15506,7 +15554,7 @@
             </a:endParaRPr>
           </a:p>
           <a:p>
-            <a:pPr indent="0" lvl="0" marL="0" marR="0" rtl="0" algn="l">
+            <a:pPr indent="0" lvl="0" marL="0" rtl="0" algn="l">
               <a:spcBef>
                 <a:spcPts val="0"/>
               </a:spcBef>
@@ -15518,18 +15566,18 @@
             <a:r>
               <a:rPr lang="en-US" sz="1800">
                 <a:solidFill>
-                  <a:schemeClr val="dk1"/>
+                  <a:schemeClr val="dk2"/>
                 </a:solidFill>
                 <a:latin typeface="Gill Sans"/>
                 <a:ea typeface="Gill Sans"/>
                 <a:cs typeface="Gill Sans"/>
                 <a:sym typeface="Gill Sans"/>
               </a:rPr>
-              <a:t>Albertsons:  -0.118</a:t>
+              <a:t>Dividend earnings is the number of shares held multiplied by the dividend per share to give a total amount per dividend issue..</a:t>
             </a:r>
             <a:endParaRPr sz="1800">
               <a:solidFill>
-                <a:schemeClr val="dk1"/>
+                <a:schemeClr val="dk2"/>
               </a:solidFill>
               <a:latin typeface="Gill Sans"/>
               <a:ea typeface="Gill Sans"/>
@@ -15770,7 +15818,7 @@
   <p:cSld>
     <p:spTree>
       <p:nvGrpSpPr>
-        <p:cNvPr id="225" name="Shape 225"/>
+        <p:cNvPr id="226" name="Shape 226"/>
         <p:cNvGrpSpPr/>
         <p:nvPr/>
       </p:nvGrpSpPr>
@@ -15784,7 +15832,7 @@
       </p:grpSpPr>
       <p:sp>
         <p:nvSpPr>
-          <p:cNvPr id="226" name="Google Shape;226;p17"/>
+          <p:cNvPr id="227" name="Google Shape;227;p18"/>
           <p:cNvSpPr txBox="1"/>
           <p:nvPr>
             <p:ph type="title"/>
@@ -15824,7 +15872,8 @@
               <a:buNone/>
             </a:pPr>
             <a:r>
-              <a:t/>
+              <a:rPr lang="en-US"/>
+              <a:t>ARE THERE ANY OTHER FACTORS THAT CAN INFLUENCE OUR DECISION?</a:t>
             </a:r>
             <a:endParaRPr/>
           </a:p>
@@ -15832,7 +15881,354 @@
       </p:sp>
       <p:pic>
         <p:nvPicPr>
-          <p:cNvPr id="227" name="Google Shape;227;p17"/>
+          <p:cNvPr id="228" name="Google Shape;228;p18"/>
+          <p:cNvPicPr preferRelativeResize="0"/>
+          <p:nvPr/>
+        </p:nvPicPr>
+        <p:blipFill rotWithShape="1">
+          <a:blip r:embed="rId3">
+            <a:alphaModFix/>
+          </a:blip>
+          <a:srcRect b="0" l="0" r="0" t="0"/>
+          <a:stretch/>
+        </p:blipFill>
+        <p:spPr>
+          <a:xfrm>
+            <a:off x="473690" y="1900012"/>
+            <a:ext cx="7536220" cy="4778851"/>
+          </a:xfrm>
+          <a:prstGeom prst="rect">
+            <a:avLst/>
+          </a:prstGeom>
+          <a:noFill/>
+          <a:ln>
+            <a:noFill/>
+          </a:ln>
+        </p:spPr>
+      </p:pic>
+      <p:sp>
+        <p:nvSpPr>
+          <p:cNvPr id="229" name="Google Shape;229;p18"/>
+          <p:cNvSpPr txBox="1"/>
+          <p:nvPr/>
+        </p:nvSpPr>
+        <p:spPr>
+          <a:xfrm>
+            <a:off x="8009910" y="2120900"/>
+            <a:ext cx="2750700" cy="2586000"/>
+          </a:xfrm>
+          <a:prstGeom prst="rect">
+            <a:avLst/>
+          </a:prstGeom>
+          <a:noFill/>
+          <a:ln>
+            <a:noFill/>
+          </a:ln>
+        </p:spPr>
+        <p:txBody>
+          <a:bodyPr anchorCtr="0" anchor="t" bIns="45700" lIns="91425" spcFirstLastPara="1" rIns="91425" wrap="square" tIns="45700">
+            <a:spAutoFit/>
+          </a:bodyPr>
+          <a:lstStyle/>
+          <a:p>
+            <a:pPr indent="0" lvl="0" marL="0" marR="0" rtl="0" algn="l">
+              <a:spcBef>
+                <a:spcPts val="0"/>
+              </a:spcBef>
+              <a:spcAft>
+                <a:spcPts val="0"/>
+              </a:spcAft>
+              <a:buNone/>
+            </a:pPr>
+            <a:r>
+              <a:rPr lang="en-US" sz="1800">
+                <a:solidFill>
+                  <a:schemeClr val="dk1"/>
+                </a:solidFill>
+                <a:latin typeface="Gill Sans"/>
+                <a:ea typeface="Gill Sans"/>
+                <a:cs typeface="Gill Sans"/>
+                <a:sym typeface="Gill Sans"/>
+              </a:rPr>
+              <a:t>Correlation Co – efficients:</a:t>
+            </a:r>
+            <a:endParaRPr/>
+          </a:p>
+          <a:p>
+            <a:pPr indent="0" lvl="0" marL="0" marR="0" rtl="0" algn="l">
+              <a:spcBef>
+                <a:spcPts val="0"/>
+              </a:spcBef>
+              <a:spcAft>
+                <a:spcPts val="0"/>
+              </a:spcAft>
+              <a:buNone/>
+            </a:pPr>
+            <a:r>
+              <a:t/>
+            </a:r>
+            <a:endParaRPr sz="1800">
+              <a:solidFill>
+                <a:schemeClr val="dk1"/>
+              </a:solidFill>
+              <a:latin typeface="Gill Sans"/>
+              <a:ea typeface="Gill Sans"/>
+              <a:cs typeface="Gill Sans"/>
+              <a:sym typeface="Gill Sans"/>
+            </a:endParaRPr>
+          </a:p>
+          <a:p>
+            <a:pPr indent="0" lvl="0" marL="0" marR="0" rtl="0" algn="l">
+              <a:spcBef>
+                <a:spcPts val="0"/>
+              </a:spcBef>
+              <a:spcAft>
+                <a:spcPts val="0"/>
+              </a:spcAft>
+              <a:buNone/>
+            </a:pPr>
+            <a:r>
+              <a:rPr lang="en-US" sz="1800">
+                <a:solidFill>
+                  <a:schemeClr val="dk1"/>
+                </a:solidFill>
+                <a:latin typeface="Gill Sans"/>
+                <a:ea typeface="Gill Sans"/>
+                <a:cs typeface="Gill Sans"/>
+                <a:sym typeface="Gill Sans"/>
+              </a:rPr>
+              <a:t>Walmart: -0.077</a:t>
+            </a:r>
+            <a:endParaRPr/>
+          </a:p>
+          <a:p>
+            <a:pPr indent="0" lvl="0" marL="0" marR="0" rtl="0" algn="l">
+              <a:spcBef>
+                <a:spcPts val="0"/>
+              </a:spcBef>
+              <a:spcAft>
+                <a:spcPts val="0"/>
+              </a:spcAft>
+              <a:buNone/>
+            </a:pPr>
+            <a:r>
+              <a:t/>
+            </a:r>
+            <a:endParaRPr sz="1800">
+              <a:solidFill>
+                <a:schemeClr val="dk1"/>
+              </a:solidFill>
+              <a:latin typeface="Gill Sans"/>
+              <a:ea typeface="Gill Sans"/>
+              <a:cs typeface="Gill Sans"/>
+              <a:sym typeface="Gill Sans"/>
+            </a:endParaRPr>
+          </a:p>
+          <a:p>
+            <a:pPr indent="0" lvl="0" marL="0" marR="0" rtl="0" algn="l">
+              <a:spcBef>
+                <a:spcPts val="0"/>
+              </a:spcBef>
+              <a:spcAft>
+                <a:spcPts val="0"/>
+              </a:spcAft>
+              <a:buNone/>
+            </a:pPr>
+            <a:r>
+              <a:rPr lang="en-US" sz="1800">
+                <a:solidFill>
+                  <a:schemeClr val="dk1"/>
+                </a:solidFill>
+                <a:latin typeface="Gill Sans"/>
+                <a:ea typeface="Gill Sans"/>
+                <a:cs typeface="Gill Sans"/>
+                <a:sym typeface="Gill Sans"/>
+              </a:rPr>
+              <a:t>Costco:  -0.151</a:t>
+            </a:r>
+            <a:endParaRPr/>
+          </a:p>
+          <a:p>
+            <a:pPr indent="0" lvl="0" marL="0" marR="0" rtl="0" algn="l">
+              <a:spcBef>
+                <a:spcPts val="0"/>
+              </a:spcBef>
+              <a:spcAft>
+                <a:spcPts val="0"/>
+              </a:spcAft>
+              <a:buNone/>
+            </a:pPr>
+            <a:r>
+              <a:t/>
+            </a:r>
+            <a:endParaRPr sz="1800">
+              <a:solidFill>
+                <a:schemeClr val="dk1"/>
+              </a:solidFill>
+              <a:latin typeface="Gill Sans"/>
+              <a:ea typeface="Gill Sans"/>
+              <a:cs typeface="Gill Sans"/>
+              <a:sym typeface="Gill Sans"/>
+            </a:endParaRPr>
+          </a:p>
+          <a:p>
+            <a:pPr indent="0" lvl="0" marL="0" marR="0" rtl="0" algn="l">
+              <a:spcBef>
+                <a:spcPts val="0"/>
+              </a:spcBef>
+              <a:spcAft>
+                <a:spcPts val="0"/>
+              </a:spcAft>
+              <a:buNone/>
+            </a:pPr>
+            <a:r>
+              <a:rPr lang="en-US" sz="1800">
+                <a:solidFill>
+                  <a:schemeClr val="dk1"/>
+                </a:solidFill>
+                <a:latin typeface="Gill Sans"/>
+                <a:ea typeface="Gill Sans"/>
+                <a:cs typeface="Gill Sans"/>
+                <a:sym typeface="Gill Sans"/>
+              </a:rPr>
+              <a:t>Target: -0.272</a:t>
+            </a:r>
+            <a:endParaRPr/>
+          </a:p>
+          <a:p>
+            <a:pPr indent="0" lvl="0" marL="0" marR="0" rtl="0" algn="l">
+              <a:spcBef>
+                <a:spcPts val="0"/>
+              </a:spcBef>
+              <a:spcAft>
+                <a:spcPts val="0"/>
+              </a:spcAft>
+              <a:buNone/>
+            </a:pPr>
+            <a:r>
+              <a:t/>
+            </a:r>
+            <a:endParaRPr sz="1800">
+              <a:solidFill>
+                <a:schemeClr val="dk1"/>
+              </a:solidFill>
+              <a:latin typeface="Gill Sans"/>
+              <a:ea typeface="Gill Sans"/>
+              <a:cs typeface="Gill Sans"/>
+              <a:sym typeface="Gill Sans"/>
+            </a:endParaRPr>
+          </a:p>
+          <a:p>
+            <a:pPr indent="0" lvl="0" marL="0" marR="0" rtl="0" algn="l">
+              <a:spcBef>
+                <a:spcPts val="0"/>
+              </a:spcBef>
+              <a:spcAft>
+                <a:spcPts val="0"/>
+              </a:spcAft>
+              <a:buNone/>
+            </a:pPr>
+            <a:r>
+              <a:rPr lang="en-US" sz="1800">
+                <a:solidFill>
+                  <a:schemeClr val="dk1"/>
+                </a:solidFill>
+                <a:latin typeface="Gill Sans"/>
+                <a:ea typeface="Gill Sans"/>
+                <a:cs typeface="Gill Sans"/>
+                <a:sym typeface="Gill Sans"/>
+              </a:rPr>
+              <a:t>Albertsons:  -0.118</a:t>
+            </a:r>
+            <a:endParaRPr sz="1800">
+              <a:solidFill>
+                <a:schemeClr val="dk1"/>
+              </a:solidFill>
+              <a:latin typeface="Gill Sans"/>
+              <a:ea typeface="Gill Sans"/>
+              <a:cs typeface="Gill Sans"/>
+              <a:sym typeface="Gill Sans"/>
+            </a:endParaRPr>
+          </a:p>
+        </p:txBody>
+      </p:sp>
+    </p:spTree>
+  </p:cSld>
+  <p:clrMapOvr>
+    <a:masterClrMapping/>
+  </p:clrMapOvr>
+</p:sld>
+</file>
+
+<file path=ppt/slides/slide21.xml><?xml version="1.0" encoding="utf-8"?>
+<p:sld xmlns:a="http://schemas.openxmlformats.org/drawingml/2006/main" xmlns:r="http://schemas.openxmlformats.org/officeDocument/2006/relationships" xmlns:mc="http://schemas.openxmlformats.org/markup-compatibility/2006" xmlns:mv="urn:schemas-microsoft-com:mac:vml" xmlns:p="http://schemas.openxmlformats.org/presentationml/2006/main" xmlns:c="http://schemas.openxmlformats.org/drawingml/2006/chart" xmlns:dgm="http://schemas.openxmlformats.org/drawingml/2006/diagram" xmlns:o="urn:schemas-microsoft-com:office:office" xmlns:v="urn:schemas-microsoft-com:vml" xmlns:pvml="urn:schemas-microsoft-com:office:powerpoint" xmlns:com="http://schemas.openxmlformats.org/drawingml/2006/compatibility" xmlns:p14="http://schemas.microsoft.com/office/powerpoint/2010/main" xmlns:p15="http://schemas.microsoft.com/office/powerpoint/2012/main" xmlns:ahyp="http://schemas.microsoft.com/office/drawing/2018/hyperlinkcolor">
+  <p:cSld>
+    <p:spTree>
+      <p:nvGrpSpPr>
+        <p:cNvPr id="233" name="Shape 233"/>
+        <p:cNvGrpSpPr/>
+        <p:nvPr/>
+      </p:nvGrpSpPr>
+      <p:grpSpPr>
+        <a:xfrm>
+          <a:off x="0" y="0"/>
+          <a:ext cx="0" cy="0"/>
+          <a:chOff x="0" y="0"/>
+          <a:chExt cx="0" cy="0"/>
+        </a:xfrm>
+      </p:grpSpPr>
+      <p:sp>
+        <p:nvSpPr>
+          <p:cNvPr id="234" name="Google Shape;234;p17"/>
+          <p:cNvSpPr txBox="1"/>
+          <p:nvPr>
+            <p:ph type="title"/>
+          </p:nvPr>
+        </p:nvSpPr>
+        <p:spPr>
+          <a:xfrm>
+            <a:off x="581192" y="702156"/>
+            <a:ext cx="11029616" cy="1013800"/>
+          </a:xfrm>
+          <a:prstGeom prst="rect">
+            <a:avLst/>
+          </a:prstGeom>
+          <a:noFill/>
+          <a:ln>
+            <a:noFill/>
+          </a:ln>
+        </p:spPr>
+        <p:txBody>
+          <a:bodyPr anchorCtr="0" anchor="b" bIns="45700" lIns="91425" spcFirstLastPara="1" rIns="91425" wrap="square" tIns="45700">
+            <a:normAutofit/>
+          </a:bodyPr>
+          <a:lstStyle/>
+          <a:p>
+            <a:pPr indent="0" lvl="0" marL="0" rtl="0" algn="l">
+              <a:spcBef>
+                <a:spcPts val="0"/>
+              </a:spcBef>
+              <a:spcAft>
+                <a:spcPts val="0"/>
+              </a:spcAft>
+              <a:buClr>
+                <a:schemeClr val="lt1"/>
+              </a:buClr>
+              <a:buSzPts val="2800"/>
+              <a:buFont typeface="Gill Sans"/>
+              <a:buNone/>
+            </a:pPr>
+            <a:r>
+              <a:rPr lang="en-US"/>
+              <a:t>ARE THERE ANY OTHER FACTORS THAT CAN INFLUENCE OUR DECISION?</a:t>
+            </a:r>
+            <a:endParaRPr/>
+          </a:p>
+        </p:txBody>
+      </p:sp>
+      <p:pic>
+        <p:nvPicPr>
+          <p:cNvPr id="235" name="Google Shape;235;p17"/>
           <p:cNvPicPr preferRelativeResize="0"/>
           <p:nvPr>
             <p:ph idx="1" type="body"/>
@@ -15861,7 +16257,7 @@
       </p:pic>
       <p:pic>
         <p:nvPicPr>
-          <p:cNvPr id="228" name="Google Shape;228;p17"/>
+          <p:cNvPr id="236" name="Google Shape;236;p17"/>
           <p:cNvPicPr preferRelativeResize="0"/>
           <p:nvPr/>
         </p:nvPicPr>
@@ -15894,12 +16290,12 @@
 </p:sld>
 </file>
 
-<file path=ppt/slides/slide21.xml><?xml version="1.0" encoding="utf-8"?>
+<file path=ppt/slides/slide22.xml><?xml version="1.0" encoding="utf-8"?>
 <p:sld xmlns:a="http://schemas.openxmlformats.org/drawingml/2006/main" xmlns:r="http://schemas.openxmlformats.org/officeDocument/2006/relationships" xmlns:mc="http://schemas.openxmlformats.org/markup-compatibility/2006" xmlns:mv="urn:schemas-microsoft-com:mac:vml" xmlns:p="http://schemas.openxmlformats.org/presentationml/2006/main" xmlns:c="http://schemas.openxmlformats.org/drawingml/2006/chart" xmlns:dgm="http://schemas.openxmlformats.org/drawingml/2006/diagram" xmlns:o="urn:schemas-microsoft-com:office:office" xmlns:v="urn:schemas-microsoft-com:vml" xmlns:pvml="urn:schemas-microsoft-com:office:powerpoint" xmlns:com="http://schemas.openxmlformats.org/drawingml/2006/compatibility" xmlns:p14="http://schemas.microsoft.com/office/powerpoint/2010/main" xmlns:p15="http://schemas.microsoft.com/office/powerpoint/2012/main" xmlns:ahyp="http://schemas.microsoft.com/office/drawing/2018/hyperlinkcolor">
   <p:cSld>
     <p:spTree>
       <p:nvGrpSpPr>
-        <p:cNvPr id="232" name="Shape 232"/>
+        <p:cNvPr id="240" name="Shape 240"/>
         <p:cNvGrpSpPr/>
         <p:nvPr/>
       </p:nvGrpSpPr>
@@ -15913,7 +16309,7 @@
       </p:grpSpPr>
       <p:sp>
         <p:nvSpPr>
-          <p:cNvPr id="233" name="Google Shape;233;p24"/>
+          <p:cNvPr id="241" name="Google Shape;241;p24"/>
           <p:cNvSpPr txBox="1"/>
           <p:nvPr>
             <p:ph type="title"/>
@@ -15962,7 +16358,7 @@
       </p:sp>
       <p:sp>
         <p:nvSpPr>
-          <p:cNvPr id="234" name="Google Shape;234;p24"/>
+          <p:cNvPr id="242" name="Google Shape;242;p24"/>
           <p:cNvSpPr txBox="1"/>
           <p:nvPr>
             <p:ph idx="1" type="body"/>
@@ -15998,41 +16394,7 @@
               <a:buNone/>
             </a:pPr>
             <a:r>
-              <a:rPr lang="en-US"/>
-              <a:t>Based on ROI, it is hard to look past Costco!</a:t>
-            </a:r>
-            <a:endParaRPr/>
-          </a:p>
-          <a:p>
-            <a:pPr indent="-200844" lvl="0" marL="306000" rtl="0" algn="l">
-              <a:spcBef>
-                <a:spcPts val="0"/>
-              </a:spcBef>
-              <a:spcAft>
-                <a:spcPts val="0"/>
-              </a:spcAft>
-              <a:buSzPts val="1656"/>
-              <a:buNone/>
-            </a:pPr>
-            <a:r>
               <a:t/>
-            </a:r>
-            <a:endParaRPr/>
-          </a:p>
-          <a:p>
-            <a:pPr indent="-200844" lvl="0" marL="306000" rtl="0" algn="l">
-              <a:spcBef>
-                <a:spcPts val="0"/>
-              </a:spcBef>
-              <a:spcAft>
-                <a:spcPts val="0"/>
-              </a:spcAft>
-              <a:buSzPts val="1656"/>
-              <a:buNone/>
-            </a:pPr>
-            <a:r>
-              <a:rPr lang="en-US"/>
-              <a:t>However, over the last 3 months, its share price has been declining - do we think this is a pattern of things to come? </a:t>
             </a:r>
             <a:endParaRPr/>
           </a:p>
@@ -16079,12 +16441,12 @@
 </p:sld>
 </file>
 
-<file path=ppt/slides/slide22.xml><?xml version="1.0" encoding="utf-8"?>
+<file path=ppt/slides/slide23.xml><?xml version="1.0" encoding="utf-8"?>
 <p:sld xmlns:a="http://schemas.openxmlformats.org/drawingml/2006/main" xmlns:r="http://schemas.openxmlformats.org/officeDocument/2006/relationships" xmlns:mc="http://schemas.openxmlformats.org/markup-compatibility/2006" xmlns:mv="urn:schemas-microsoft-com:mac:vml" xmlns:p="http://schemas.openxmlformats.org/presentationml/2006/main" xmlns:c="http://schemas.openxmlformats.org/drawingml/2006/chart" xmlns:dgm="http://schemas.openxmlformats.org/drawingml/2006/diagram" xmlns:o="urn:schemas-microsoft-com:office:office" xmlns:v="urn:schemas-microsoft-com:vml" xmlns:pvml="urn:schemas-microsoft-com:office:powerpoint" xmlns:com="http://schemas.openxmlformats.org/drawingml/2006/compatibility" xmlns:p14="http://schemas.microsoft.com/office/powerpoint/2010/main" xmlns:p15="http://schemas.microsoft.com/office/powerpoint/2012/main" xmlns:ahyp="http://schemas.microsoft.com/office/drawing/2018/hyperlinkcolor">
   <p:cSld>
     <p:spTree>
       <p:nvGrpSpPr>
-        <p:cNvPr id="238" name="Shape 238"/>
+        <p:cNvPr id="246" name="Shape 246"/>
         <p:cNvGrpSpPr/>
         <p:nvPr/>
       </p:nvGrpSpPr>
@@ -16098,7 +16460,7 @@
       </p:grpSpPr>
       <p:sp>
         <p:nvSpPr>
-          <p:cNvPr id="239" name="Google Shape;239;p25"/>
+          <p:cNvPr id="247" name="Google Shape;247;p25"/>
           <p:cNvSpPr txBox="1"/>
           <p:nvPr>
             <p:ph type="title"/>
@@ -16147,7 +16509,7 @@
       </p:sp>
       <p:sp>
         <p:nvSpPr>
-          <p:cNvPr id="240" name="Google Shape;240;p25"/>
+          <p:cNvPr id="248" name="Google Shape;248;p25"/>
           <p:cNvSpPr txBox="1"/>
           <p:nvPr>
             <p:ph idx="1" type="body"/>
@@ -16344,7 +16706,7 @@
           </a:prstGeom>
         </p:spPr>
         <p:txBody>
-          <a:bodyPr anchorCtr="0" anchor="ctr" bIns="45700" lIns="91425" spcFirstLastPara="1" rIns="91425" wrap="square" tIns="45700">
+          <a:bodyPr anchorCtr="0" anchor="t" bIns="45700" lIns="91425" spcFirstLastPara="1" rIns="91425" wrap="square" tIns="45700">
             <a:normAutofit/>
           </a:bodyPr>
           <a:lstStyle/>
@@ -16354,14 +16716,150 @@
                 <a:spcPts val="360"/>
               </a:spcBef>
               <a:spcAft>
+                <a:spcPts val="0"/>
+              </a:spcAft>
+              <a:buNone/>
+            </a:pPr>
+            <a:r>
+              <a:rPr b="1" lang="en-US"/>
+              <a:t>Investment returns:</a:t>
+            </a:r>
+            <a:endParaRPr b="1"/>
+          </a:p>
+          <a:p>
+            <a:pPr indent="457200" lvl="0" marL="0" rtl="0" algn="l">
+              <a:spcBef>
                 <a:spcPts val="600"/>
+              </a:spcBef>
+              <a:spcAft>
+                <a:spcPts val="0"/>
+              </a:spcAft>
+              <a:buNone/>
+            </a:pPr>
+            <a:r>
+              <a:rPr lang="en-US"/>
+              <a:t>Increase in the Share Price </a:t>
+            </a:r>
+            <a:r>
+              <a:rPr lang="en-US">
+                <a:solidFill>
+                  <a:srgbClr val="6AA84F"/>
+                </a:solidFill>
+              </a:rPr>
+              <a:t>⬆</a:t>
+            </a:r>
+            <a:endParaRPr>
+              <a:solidFill>
+                <a:srgbClr val="6AA84F"/>
+              </a:solidFill>
+            </a:endParaRPr>
+          </a:p>
+          <a:p>
+            <a:pPr indent="457200" lvl="0" marL="0" rtl="0" algn="l">
+              <a:spcBef>
+                <a:spcPts val="600"/>
+              </a:spcBef>
+              <a:spcAft>
+                <a:spcPts val="0"/>
+              </a:spcAft>
+              <a:buNone/>
+            </a:pPr>
+            <a:r>
+              <a:rPr lang="en-US">
+                <a:solidFill>
+                  <a:schemeClr val="dk1"/>
+                </a:solidFill>
+              </a:rPr>
+              <a:t>Increase in Dividends </a:t>
+            </a:r>
+            <a:r>
+              <a:rPr lang="en-US">
+                <a:solidFill>
+                  <a:srgbClr val="6AA84F"/>
+                </a:solidFill>
+              </a:rPr>
+              <a:t>⬆</a:t>
+            </a:r>
+            <a:endParaRPr>
+              <a:solidFill>
+                <a:srgbClr val="6AA84F"/>
+              </a:solidFill>
+            </a:endParaRPr>
+          </a:p>
+          <a:p>
+            <a:pPr indent="0" lvl="0" marL="0" rtl="0" algn="l">
+              <a:spcBef>
+                <a:spcPts val="600"/>
+              </a:spcBef>
+              <a:spcAft>
+                <a:spcPts val="0"/>
               </a:spcAft>
               <a:buNone/>
             </a:pPr>
             <a:r>
               <a:t/>
             </a:r>
-            <a:endParaRPr/>
+            <a:endParaRPr>
+              <a:solidFill>
+                <a:srgbClr val="6AA84F"/>
+              </a:solidFill>
+            </a:endParaRPr>
+          </a:p>
+          <a:p>
+            <a:pPr indent="0" lvl="0" marL="0" rtl="0" algn="l">
+              <a:spcBef>
+                <a:spcPts val="600"/>
+              </a:spcBef>
+              <a:spcAft>
+                <a:spcPts val="0"/>
+              </a:spcAft>
+              <a:buNone/>
+            </a:pPr>
+            <a:r>
+              <a:rPr b="1" lang="en-US">
+                <a:solidFill>
+                  <a:schemeClr val="dk1"/>
+                </a:solidFill>
+              </a:rPr>
+              <a:t>Decision Aid:</a:t>
+            </a:r>
+            <a:endParaRPr b="1">
+              <a:solidFill>
+                <a:schemeClr val="dk1"/>
+              </a:solidFill>
+            </a:endParaRPr>
+          </a:p>
+          <a:p>
+            <a:pPr indent="0" lvl="0" marL="457200" rtl="0" algn="l">
+              <a:spcBef>
+                <a:spcPts val="600"/>
+              </a:spcBef>
+              <a:spcAft>
+                <a:spcPts val="600"/>
+              </a:spcAft>
+              <a:buNone/>
+            </a:pPr>
+            <a:r>
+              <a:rPr lang="en-US" sz="3600">
+                <a:solidFill>
+                  <a:srgbClr val="6AA84F"/>
+                </a:solidFill>
+              </a:rPr>
+              <a:t>6</a:t>
+            </a:r>
+            <a:r>
+              <a:rPr lang="en-US">
+                <a:solidFill>
+                  <a:schemeClr val="dk1"/>
+                </a:solidFill>
+              </a:rPr>
+              <a:t> Questions</a:t>
+            </a:r>
+            <a:endParaRPr>
+              <a:solidFill>
+                <a:schemeClr val="dk1"/>
+              </a:solidFill>
+            </a:endParaRPr>
           </a:p>
         </p:txBody>
       </p:sp>

</xml_diff>